<commit_message>
Relationship of institution and asset
</commit_message>
<xml_diff>
--- a/LOGO/LOGO.pptx
+++ b/LOGO/LOGO.pptx
@@ -12,6 +12,7 @@
     <p:sldId id="259" r:id="rId6"/>
     <p:sldId id="260" r:id="rId7"/>
     <p:sldId id="262" r:id="rId8"/>
+    <p:sldId id="263" r:id="rId9"/>
   </p:sldIdLst>
   <p:sldSz cx="12192000" cy="6858000"/>
   <p:notesSz cx="6858000" cy="9144000"/>
@@ -267,7 +268,7 @@
           <a:p>
             <a:fld id="{65E0C4A3-87A7-E446-9182-09EE0C8F89BC}" type="datetimeFigureOut">
               <a:rPr lang="en-CN" smtClean="0"/>
-              <a:t>2025/9/19</a:t>
+              <a:t>2025/9/20</a:t>
             </a:fld>
             <a:endParaRPr lang="en-CN"/>
           </a:p>
@@ -467,7 +468,7 @@
           <a:p>
             <a:fld id="{65E0C4A3-87A7-E446-9182-09EE0C8F89BC}" type="datetimeFigureOut">
               <a:rPr lang="en-CN" smtClean="0"/>
-              <a:t>2025/9/19</a:t>
+              <a:t>2025/9/20</a:t>
             </a:fld>
             <a:endParaRPr lang="en-CN"/>
           </a:p>
@@ -677,7 +678,7 @@
           <a:p>
             <a:fld id="{65E0C4A3-87A7-E446-9182-09EE0C8F89BC}" type="datetimeFigureOut">
               <a:rPr lang="en-CN" smtClean="0"/>
-              <a:t>2025/9/19</a:t>
+              <a:t>2025/9/20</a:t>
             </a:fld>
             <a:endParaRPr lang="en-CN"/>
           </a:p>
@@ -877,7 +878,7 @@
           <a:p>
             <a:fld id="{65E0C4A3-87A7-E446-9182-09EE0C8F89BC}" type="datetimeFigureOut">
               <a:rPr lang="en-CN" smtClean="0"/>
-              <a:t>2025/9/19</a:t>
+              <a:t>2025/9/20</a:t>
             </a:fld>
             <a:endParaRPr lang="en-CN"/>
           </a:p>
@@ -1153,7 +1154,7 @@
           <a:p>
             <a:fld id="{65E0C4A3-87A7-E446-9182-09EE0C8F89BC}" type="datetimeFigureOut">
               <a:rPr lang="en-CN" smtClean="0"/>
-              <a:t>2025/9/19</a:t>
+              <a:t>2025/9/20</a:t>
             </a:fld>
             <a:endParaRPr lang="en-CN"/>
           </a:p>
@@ -1421,7 +1422,7 @@
           <a:p>
             <a:fld id="{65E0C4A3-87A7-E446-9182-09EE0C8F89BC}" type="datetimeFigureOut">
               <a:rPr lang="en-CN" smtClean="0"/>
-              <a:t>2025/9/19</a:t>
+              <a:t>2025/9/20</a:t>
             </a:fld>
             <a:endParaRPr lang="en-CN"/>
           </a:p>
@@ -1836,7 +1837,7 @@
           <a:p>
             <a:fld id="{65E0C4A3-87A7-E446-9182-09EE0C8F89BC}" type="datetimeFigureOut">
               <a:rPr lang="en-CN" smtClean="0"/>
-              <a:t>2025/9/19</a:t>
+              <a:t>2025/9/20</a:t>
             </a:fld>
             <a:endParaRPr lang="en-CN"/>
           </a:p>
@@ -1978,7 +1979,7 @@
           <a:p>
             <a:fld id="{65E0C4A3-87A7-E446-9182-09EE0C8F89BC}" type="datetimeFigureOut">
               <a:rPr lang="en-CN" smtClean="0"/>
-              <a:t>2025/9/19</a:t>
+              <a:t>2025/9/20</a:t>
             </a:fld>
             <a:endParaRPr lang="en-CN"/>
           </a:p>
@@ -2091,7 +2092,7 @@
           <a:p>
             <a:fld id="{65E0C4A3-87A7-E446-9182-09EE0C8F89BC}" type="datetimeFigureOut">
               <a:rPr lang="en-CN" smtClean="0"/>
-              <a:t>2025/9/19</a:t>
+              <a:t>2025/9/20</a:t>
             </a:fld>
             <a:endParaRPr lang="en-CN"/>
           </a:p>
@@ -2404,7 +2405,7 @@
           <a:p>
             <a:fld id="{65E0C4A3-87A7-E446-9182-09EE0C8F89BC}" type="datetimeFigureOut">
               <a:rPr lang="en-CN" smtClean="0"/>
-              <a:t>2025/9/19</a:t>
+              <a:t>2025/9/20</a:t>
             </a:fld>
             <a:endParaRPr lang="en-CN"/>
           </a:p>
@@ -2693,7 +2694,7 @@
           <a:p>
             <a:fld id="{65E0C4A3-87A7-E446-9182-09EE0C8F89BC}" type="datetimeFigureOut">
               <a:rPr lang="en-CN" smtClean="0"/>
-              <a:t>2025/9/19</a:t>
+              <a:t>2025/9/20</a:t>
             </a:fld>
             <a:endParaRPr lang="en-CN"/>
           </a:p>
@@ -2936,7 +2937,7 @@
           <a:p>
             <a:fld id="{65E0C4A3-87A7-E446-9182-09EE0C8F89BC}" type="datetimeFigureOut">
               <a:rPr lang="en-CN" smtClean="0"/>
-              <a:t>2025/9/19</a:t>
+              <a:t>2025/9/20</a:t>
             </a:fld>
             <a:endParaRPr lang="en-CN"/>
           </a:p>
@@ -7148,6 +7149,893 @@
 </p:sld>
 </file>
 
+<file path=ppt/slides/slide8.xml><?xml version="1.0" encoding="utf-8"?>
+<p:sld xmlns:a="http://schemas.openxmlformats.org/drawingml/2006/main" xmlns:r="http://schemas.openxmlformats.org/officeDocument/2006/relationships" xmlns:p="http://schemas.openxmlformats.org/presentationml/2006/main">
+  <p:cSld>
+    <p:bg>
+      <p:bgPr>
+        <a:gradFill>
+          <a:gsLst>
+            <a:gs pos="0">
+              <a:schemeClr val="accent1">
+                <a:lumMod val="5000"/>
+                <a:lumOff val="95000"/>
+              </a:schemeClr>
+            </a:gs>
+            <a:gs pos="74000">
+              <a:schemeClr val="accent1">
+                <a:lumMod val="45000"/>
+                <a:lumOff val="55000"/>
+              </a:schemeClr>
+            </a:gs>
+            <a:gs pos="83000">
+              <a:schemeClr val="accent1">
+                <a:lumMod val="45000"/>
+                <a:lumOff val="55000"/>
+              </a:schemeClr>
+            </a:gs>
+            <a:gs pos="100000">
+              <a:schemeClr val="accent1">
+                <a:lumMod val="30000"/>
+                <a:lumOff val="70000"/>
+              </a:schemeClr>
+            </a:gs>
+          </a:gsLst>
+          <a:path path="rect">
+            <a:fillToRect l="100000" t="100000"/>
+          </a:path>
+        </a:gradFill>
+        <a:effectLst/>
+      </p:bgPr>
+    </p:bg>
+    <p:spTree>
+      <p:nvGrpSpPr>
+        <p:cNvPr id="1" name="">
+          <a:extLst>
+            <a:ext uri="{FF2B5EF4-FFF2-40B4-BE49-F238E27FC236}">
+              <a16:creationId xmlns:a16="http://schemas.microsoft.com/office/drawing/2014/main" id="{C68DF2C6-4D64-0A9D-CA81-EBAE7566EFC7}"/>
+            </a:ext>
+          </a:extLst>
+        </p:cNvPr>
+        <p:cNvGrpSpPr/>
+        <p:nvPr/>
+      </p:nvGrpSpPr>
+      <p:grpSpPr>
+        <a:xfrm>
+          <a:off x="0" y="0"/>
+          <a:ext cx="0" cy="0"/>
+          <a:chOff x="0" y="0"/>
+          <a:chExt cx="0" cy="0"/>
+        </a:xfrm>
+      </p:grpSpPr>
+      <p:grpSp>
+        <p:nvGrpSpPr>
+          <p:cNvPr id="5" name="Group 4">
+            <a:extLst>
+              <a:ext uri="{FF2B5EF4-FFF2-40B4-BE49-F238E27FC236}">
+                <a16:creationId xmlns:a16="http://schemas.microsoft.com/office/drawing/2014/main" id="{4B41443C-9F46-268C-9AD6-130710956B5D}"/>
+              </a:ext>
+            </a:extLst>
+          </p:cNvPr>
+          <p:cNvGrpSpPr/>
+          <p:nvPr/>
+        </p:nvGrpSpPr>
+        <p:grpSpPr>
+          <a:xfrm>
+            <a:off x="528215" y="324258"/>
+            <a:ext cx="3686400" cy="3686400"/>
+            <a:chOff x="4970819" y="1635473"/>
+            <a:chExt cx="3600000" cy="3600000"/>
+          </a:xfrm>
+        </p:grpSpPr>
+        <p:sp>
+          <p:nvSpPr>
+            <p:cNvPr id="2" name="Rounded Rectangle 1">
+              <a:extLst>
+                <a:ext uri="{FF2B5EF4-FFF2-40B4-BE49-F238E27FC236}">
+                  <a16:creationId xmlns:a16="http://schemas.microsoft.com/office/drawing/2014/main" id="{FB81AD4F-6FE3-9EB8-AD7C-6BE0DD60C30D}"/>
+                </a:ext>
+              </a:extLst>
+            </p:cNvPr>
+            <p:cNvSpPr/>
+            <p:nvPr/>
+          </p:nvSpPr>
+          <p:spPr>
+            <a:xfrm>
+              <a:off x="4970819" y="1635473"/>
+              <a:ext cx="3600000" cy="3600000"/>
+            </a:xfrm>
+            <a:prstGeom prst="roundRect">
+              <a:avLst>
+                <a:gd name="adj" fmla="val 13588"/>
+              </a:avLst>
+            </a:prstGeom>
+            <a:solidFill>
+              <a:schemeClr val="bg1"/>
+            </a:solidFill>
+            <a:ln>
+              <a:noFill/>
+            </a:ln>
+          </p:spPr>
+          <p:style>
+            <a:lnRef idx="2">
+              <a:schemeClr val="accent1">
+                <a:shade val="15000"/>
+              </a:schemeClr>
+            </a:lnRef>
+            <a:fillRef idx="1">
+              <a:schemeClr val="accent1"/>
+            </a:fillRef>
+            <a:effectRef idx="0">
+              <a:schemeClr val="accent1"/>
+            </a:effectRef>
+            <a:fontRef idx="minor">
+              <a:schemeClr val="lt1"/>
+            </a:fontRef>
+          </p:style>
+          <p:txBody>
+            <a:bodyPr rtlCol="0" anchor="ctr"/>
+            <a:lstStyle/>
+            <a:p>
+              <a:pPr algn="ctr"/>
+              <a:endParaRPr lang="en-CN"/>
+            </a:p>
+          </p:txBody>
+        </p:sp>
+        <p:grpSp>
+          <p:nvGrpSpPr>
+            <p:cNvPr id="30" name="Group 29">
+              <a:extLst>
+                <a:ext uri="{FF2B5EF4-FFF2-40B4-BE49-F238E27FC236}">
+                  <a16:creationId xmlns:a16="http://schemas.microsoft.com/office/drawing/2014/main" id="{25962D09-62E2-8508-3BB2-F96A2E6C3D35}"/>
+                </a:ext>
+              </a:extLst>
+            </p:cNvPr>
+            <p:cNvGrpSpPr/>
+            <p:nvPr/>
+          </p:nvGrpSpPr>
+          <p:grpSpPr>
+            <a:xfrm>
+              <a:off x="5420819" y="2085473"/>
+              <a:ext cx="2700000" cy="2700000"/>
+              <a:chOff x="5628118" y="2104874"/>
+              <a:chExt cx="2774246" cy="2611513"/>
+            </a:xfrm>
+          </p:grpSpPr>
+          <p:sp>
+            <p:nvSpPr>
+              <p:cNvPr id="24" name="Freeform 23">
+                <a:extLst>
+                  <a:ext uri="{FF2B5EF4-FFF2-40B4-BE49-F238E27FC236}">
+                    <a16:creationId xmlns:a16="http://schemas.microsoft.com/office/drawing/2014/main" id="{1B3DF387-AC84-7E2E-5C6C-636834AA5578}"/>
+                  </a:ext>
+                </a:extLst>
+              </p:cNvPr>
+              <p:cNvSpPr/>
+              <p:nvPr/>
+            </p:nvSpPr>
+            <p:spPr>
+              <a:xfrm rot="16200000" flipH="1">
+                <a:off x="5662115" y="3526385"/>
+                <a:ext cx="1156005" cy="1224000"/>
+              </a:xfrm>
+              <a:custGeom>
+                <a:avLst/>
+                <a:gdLst>
+                  <a:gd name="connsiteX0" fmla="*/ 0 w 1156005"/>
+                  <a:gd name="connsiteY0" fmla="*/ 612000 h 1224000"/>
+                  <a:gd name="connsiteX1" fmla="*/ 0 w 1156005"/>
+                  <a:gd name="connsiteY1" fmla="*/ 1224000 h 1224000"/>
+                  <a:gd name="connsiteX2" fmla="*/ 1156005 w 1156005"/>
+                  <a:gd name="connsiteY2" fmla="*/ 1224000 h 1224000"/>
+                  <a:gd name="connsiteX3" fmla="*/ 1156005 w 1156005"/>
+                  <a:gd name="connsiteY3" fmla="*/ 0 h 1224000"/>
+                  <a:gd name="connsiteX4" fmla="*/ 612000 w 1156005"/>
+                  <a:gd name="connsiteY4" fmla="*/ 0 h 1224000"/>
+                  <a:gd name="connsiteX5" fmla="*/ 0 w 1156005"/>
+                  <a:gd name="connsiteY5" fmla="*/ 612000 h 1224000"/>
+                </a:gdLst>
+                <a:ahLst/>
+                <a:cxnLst>
+                  <a:cxn ang="0">
+                    <a:pos x="connsiteX0" y="connsiteY0"/>
+                  </a:cxn>
+                  <a:cxn ang="0">
+                    <a:pos x="connsiteX1" y="connsiteY1"/>
+                  </a:cxn>
+                  <a:cxn ang="0">
+                    <a:pos x="connsiteX2" y="connsiteY2"/>
+                  </a:cxn>
+                  <a:cxn ang="0">
+                    <a:pos x="connsiteX3" y="connsiteY3"/>
+                  </a:cxn>
+                  <a:cxn ang="0">
+                    <a:pos x="connsiteX4" y="connsiteY4"/>
+                  </a:cxn>
+                  <a:cxn ang="0">
+                    <a:pos x="connsiteX5" y="connsiteY5"/>
+                  </a:cxn>
+                </a:cxnLst>
+                <a:rect l="l" t="t" r="r" b="b"/>
+                <a:pathLst>
+                  <a:path w="1156005" h="1224000">
+                    <a:moveTo>
+                      <a:pt x="0" y="612000"/>
+                    </a:moveTo>
+                    <a:lnTo>
+                      <a:pt x="0" y="1224000"/>
+                    </a:lnTo>
+                    <a:lnTo>
+                      <a:pt x="1156005" y="1224000"/>
+                    </a:lnTo>
+                    <a:lnTo>
+                      <a:pt x="1156005" y="0"/>
+                    </a:lnTo>
+                    <a:lnTo>
+                      <a:pt x="612000" y="0"/>
+                    </a:lnTo>
+                    <a:cubicBezTo>
+                      <a:pt x="274002" y="0"/>
+                      <a:pt x="0" y="274002"/>
+                      <a:pt x="0" y="612000"/>
+                    </a:cubicBezTo>
+                    <a:close/>
+                  </a:path>
+                </a:pathLst>
+              </a:custGeom>
+              <a:solidFill>
+                <a:srgbClr val="3A4BC0"/>
+              </a:solidFill>
+              <a:ln>
+                <a:noFill/>
+              </a:ln>
+            </p:spPr>
+            <p:style>
+              <a:lnRef idx="2">
+                <a:schemeClr val="accent1">
+                  <a:shade val="15000"/>
+                </a:schemeClr>
+              </a:lnRef>
+              <a:fillRef idx="1">
+                <a:schemeClr val="accent1"/>
+              </a:fillRef>
+              <a:effectRef idx="0">
+                <a:schemeClr val="accent1"/>
+              </a:effectRef>
+              <a:fontRef idx="minor">
+                <a:schemeClr val="lt1"/>
+              </a:fontRef>
+            </p:style>
+            <p:txBody>
+              <a:bodyPr wrap="square" rtlCol="0" anchor="ctr">
+                <a:noAutofit/>
+              </a:bodyPr>
+              <a:lstStyle/>
+              <a:p>
+                <a:pPr algn="ctr"/>
+                <a:endParaRPr lang="en-CN" dirty="0"/>
+              </a:p>
+            </p:txBody>
+          </p:sp>
+          <p:sp>
+            <p:nvSpPr>
+              <p:cNvPr id="25" name="Freeform 24">
+                <a:extLst>
+                  <a:ext uri="{FF2B5EF4-FFF2-40B4-BE49-F238E27FC236}">
+                    <a16:creationId xmlns:a16="http://schemas.microsoft.com/office/drawing/2014/main" id="{6E9A5529-FA76-9E96-3273-308024084DA9}"/>
+                  </a:ext>
+                </a:extLst>
+              </p:cNvPr>
+              <p:cNvSpPr/>
+              <p:nvPr/>
+            </p:nvSpPr>
+            <p:spPr>
+              <a:xfrm rot="16200000" flipH="1">
+                <a:off x="6422470" y="2817000"/>
+                <a:ext cx="1156005" cy="1224000"/>
+              </a:xfrm>
+              <a:custGeom>
+                <a:avLst/>
+                <a:gdLst>
+                  <a:gd name="connsiteX0" fmla="*/ 0 w 1156005"/>
+                  <a:gd name="connsiteY0" fmla="*/ 612000 h 1224000"/>
+                  <a:gd name="connsiteX1" fmla="*/ 0 w 1156005"/>
+                  <a:gd name="connsiteY1" fmla="*/ 1224000 h 1224000"/>
+                  <a:gd name="connsiteX2" fmla="*/ 1156005 w 1156005"/>
+                  <a:gd name="connsiteY2" fmla="*/ 1224000 h 1224000"/>
+                  <a:gd name="connsiteX3" fmla="*/ 1156005 w 1156005"/>
+                  <a:gd name="connsiteY3" fmla="*/ 0 h 1224000"/>
+                  <a:gd name="connsiteX4" fmla="*/ 612000 w 1156005"/>
+                  <a:gd name="connsiteY4" fmla="*/ 0 h 1224000"/>
+                  <a:gd name="connsiteX5" fmla="*/ 0 w 1156005"/>
+                  <a:gd name="connsiteY5" fmla="*/ 612000 h 1224000"/>
+                </a:gdLst>
+                <a:ahLst/>
+                <a:cxnLst>
+                  <a:cxn ang="0">
+                    <a:pos x="connsiteX0" y="connsiteY0"/>
+                  </a:cxn>
+                  <a:cxn ang="0">
+                    <a:pos x="connsiteX1" y="connsiteY1"/>
+                  </a:cxn>
+                  <a:cxn ang="0">
+                    <a:pos x="connsiteX2" y="connsiteY2"/>
+                  </a:cxn>
+                  <a:cxn ang="0">
+                    <a:pos x="connsiteX3" y="connsiteY3"/>
+                  </a:cxn>
+                  <a:cxn ang="0">
+                    <a:pos x="connsiteX4" y="connsiteY4"/>
+                  </a:cxn>
+                  <a:cxn ang="0">
+                    <a:pos x="connsiteX5" y="connsiteY5"/>
+                  </a:cxn>
+                </a:cxnLst>
+                <a:rect l="l" t="t" r="r" b="b"/>
+                <a:pathLst>
+                  <a:path w="1156005" h="1224000">
+                    <a:moveTo>
+                      <a:pt x="0" y="612000"/>
+                    </a:moveTo>
+                    <a:lnTo>
+                      <a:pt x="0" y="1224000"/>
+                    </a:lnTo>
+                    <a:lnTo>
+                      <a:pt x="1156005" y="1224000"/>
+                    </a:lnTo>
+                    <a:lnTo>
+                      <a:pt x="1156005" y="0"/>
+                    </a:lnTo>
+                    <a:lnTo>
+                      <a:pt x="612000" y="0"/>
+                    </a:lnTo>
+                    <a:cubicBezTo>
+                      <a:pt x="274002" y="0"/>
+                      <a:pt x="0" y="274002"/>
+                      <a:pt x="0" y="612000"/>
+                    </a:cubicBezTo>
+                    <a:close/>
+                  </a:path>
+                </a:pathLst>
+              </a:custGeom>
+              <a:solidFill>
+                <a:srgbClr val="5EC7FE">
+                  <a:alpha val="80000"/>
+                </a:srgbClr>
+              </a:solidFill>
+              <a:ln>
+                <a:noFill/>
+              </a:ln>
+            </p:spPr>
+            <p:style>
+              <a:lnRef idx="2">
+                <a:schemeClr val="accent1">
+                  <a:shade val="15000"/>
+                </a:schemeClr>
+              </a:lnRef>
+              <a:fillRef idx="1">
+                <a:schemeClr val="accent1"/>
+              </a:fillRef>
+              <a:effectRef idx="0">
+                <a:schemeClr val="accent1"/>
+              </a:effectRef>
+              <a:fontRef idx="minor">
+                <a:schemeClr val="lt1"/>
+              </a:fontRef>
+            </p:style>
+            <p:txBody>
+              <a:bodyPr wrap="square" rtlCol="0" anchor="ctr">
+                <a:noAutofit/>
+              </a:bodyPr>
+              <a:lstStyle/>
+              <a:p>
+                <a:pPr algn="ctr"/>
+                <a:endParaRPr lang="en-CN" dirty="0"/>
+              </a:p>
+            </p:txBody>
+          </p:sp>
+          <p:sp>
+            <p:nvSpPr>
+              <p:cNvPr id="26" name="Freeform 25">
+                <a:extLst>
+                  <a:ext uri="{FF2B5EF4-FFF2-40B4-BE49-F238E27FC236}">
+                    <a16:creationId xmlns:a16="http://schemas.microsoft.com/office/drawing/2014/main" id="{B8822CD2-58E0-69D2-8D8E-15F9795DA474}"/>
+                  </a:ext>
+                </a:extLst>
+              </p:cNvPr>
+              <p:cNvSpPr/>
+              <p:nvPr/>
+            </p:nvSpPr>
+            <p:spPr>
+              <a:xfrm rot="16200000" flipH="1">
+                <a:off x="7212361" y="2070877"/>
+                <a:ext cx="1156005" cy="1224000"/>
+              </a:xfrm>
+              <a:custGeom>
+                <a:avLst/>
+                <a:gdLst>
+                  <a:gd name="connsiteX0" fmla="*/ 0 w 1156005"/>
+                  <a:gd name="connsiteY0" fmla="*/ 612000 h 1224000"/>
+                  <a:gd name="connsiteX1" fmla="*/ 0 w 1156005"/>
+                  <a:gd name="connsiteY1" fmla="*/ 1224000 h 1224000"/>
+                  <a:gd name="connsiteX2" fmla="*/ 1156005 w 1156005"/>
+                  <a:gd name="connsiteY2" fmla="*/ 1224000 h 1224000"/>
+                  <a:gd name="connsiteX3" fmla="*/ 1156005 w 1156005"/>
+                  <a:gd name="connsiteY3" fmla="*/ 0 h 1224000"/>
+                  <a:gd name="connsiteX4" fmla="*/ 612000 w 1156005"/>
+                  <a:gd name="connsiteY4" fmla="*/ 0 h 1224000"/>
+                  <a:gd name="connsiteX5" fmla="*/ 0 w 1156005"/>
+                  <a:gd name="connsiteY5" fmla="*/ 612000 h 1224000"/>
+                </a:gdLst>
+                <a:ahLst/>
+                <a:cxnLst>
+                  <a:cxn ang="0">
+                    <a:pos x="connsiteX0" y="connsiteY0"/>
+                  </a:cxn>
+                  <a:cxn ang="0">
+                    <a:pos x="connsiteX1" y="connsiteY1"/>
+                  </a:cxn>
+                  <a:cxn ang="0">
+                    <a:pos x="connsiteX2" y="connsiteY2"/>
+                  </a:cxn>
+                  <a:cxn ang="0">
+                    <a:pos x="connsiteX3" y="connsiteY3"/>
+                  </a:cxn>
+                  <a:cxn ang="0">
+                    <a:pos x="connsiteX4" y="connsiteY4"/>
+                  </a:cxn>
+                  <a:cxn ang="0">
+                    <a:pos x="connsiteX5" y="connsiteY5"/>
+                  </a:cxn>
+                </a:cxnLst>
+                <a:rect l="l" t="t" r="r" b="b"/>
+                <a:pathLst>
+                  <a:path w="1156005" h="1224000">
+                    <a:moveTo>
+                      <a:pt x="0" y="612000"/>
+                    </a:moveTo>
+                    <a:lnTo>
+                      <a:pt x="0" y="1224000"/>
+                    </a:lnTo>
+                    <a:lnTo>
+                      <a:pt x="1156005" y="1224000"/>
+                    </a:lnTo>
+                    <a:lnTo>
+                      <a:pt x="1156005" y="0"/>
+                    </a:lnTo>
+                    <a:lnTo>
+                      <a:pt x="612000" y="0"/>
+                    </a:lnTo>
+                    <a:cubicBezTo>
+                      <a:pt x="274002" y="0"/>
+                      <a:pt x="0" y="274002"/>
+                      <a:pt x="0" y="612000"/>
+                    </a:cubicBezTo>
+                    <a:close/>
+                  </a:path>
+                </a:pathLst>
+              </a:custGeom>
+              <a:solidFill>
+                <a:schemeClr val="accent6">
+                  <a:lumMod val="60000"/>
+                  <a:lumOff val="40000"/>
+                  <a:alpha val="80000"/>
+                </a:schemeClr>
+              </a:solidFill>
+              <a:ln>
+                <a:noFill/>
+              </a:ln>
+            </p:spPr>
+            <p:style>
+              <a:lnRef idx="2">
+                <a:schemeClr val="accent1">
+                  <a:shade val="15000"/>
+                </a:schemeClr>
+              </a:lnRef>
+              <a:fillRef idx="1">
+                <a:schemeClr val="accent1"/>
+              </a:fillRef>
+              <a:effectRef idx="0">
+                <a:schemeClr val="accent1"/>
+              </a:effectRef>
+              <a:fontRef idx="minor">
+                <a:schemeClr val="lt1"/>
+              </a:fontRef>
+            </p:style>
+            <p:txBody>
+              <a:bodyPr rtlCol="0" anchor="ctr"/>
+              <a:lstStyle/>
+              <a:p>
+                <a:pPr algn="ctr"/>
+                <a:endParaRPr lang="en-CN" dirty="0"/>
+              </a:p>
+            </p:txBody>
+          </p:sp>
+        </p:grpSp>
+      </p:grpSp>
+      <p:grpSp>
+        <p:nvGrpSpPr>
+          <p:cNvPr id="9" name="Group 8">
+            <a:extLst>
+              <a:ext uri="{FF2B5EF4-FFF2-40B4-BE49-F238E27FC236}">
+                <a16:creationId xmlns:a16="http://schemas.microsoft.com/office/drawing/2014/main" id="{E1116181-8130-D254-BF9D-BE1FB722C996}"/>
+              </a:ext>
+            </a:extLst>
+          </p:cNvPr>
+          <p:cNvGrpSpPr/>
+          <p:nvPr/>
+        </p:nvGrpSpPr>
+        <p:grpSpPr>
+          <a:xfrm>
+            <a:off x="4763151" y="378258"/>
+            <a:ext cx="324000" cy="324000"/>
+            <a:chOff x="5628118" y="2104874"/>
+            <a:chExt cx="2774246" cy="2611513"/>
+          </a:xfrm>
+        </p:grpSpPr>
+        <p:sp>
+          <p:nvSpPr>
+            <p:cNvPr id="13" name="Freeform 12">
+              <a:extLst>
+                <a:ext uri="{FF2B5EF4-FFF2-40B4-BE49-F238E27FC236}">
+                  <a16:creationId xmlns:a16="http://schemas.microsoft.com/office/drawing/2014/main" id="{17DFECDD-CEDF-B5E2-B5E7-99BE31959E99}"/>
+                </a:ext>
+              </a:extLst>
+            </p:cNvPr>
+            <p:cNvSpPr/>
+            <p:nvPr/>
+          </p:nvSpPr>
+          <p:spPr>
+            <a:xfrm rot="16200000" flipH="1">
+              <a:off x="5662115" y="3526385"/>
+              <a:ext cx="1156005" cy="1224000"/>
+            </a:xfrm>
+            <a:custGeom>
+              <a:avLst/>
+              <a:gdLst>
+                <a:gd name="connsiteX0" fmla="*/ 0 w 1156005"/>
+                <a:gd name="connsiteY0" fmla="*/ 612000 h 1224000"/>
+                <a:gd name="connsiteX1" fmla="*/ 0 w 1156005"/>
+                <a:gd name="connsiteY1" fmla="*/ 1224000 h 1224000"/>
+                <a:gd name="connsiteX2" fmla="*/ 1156005 w 1156005"/>
+                <a:gd name="connsiteY2" fmla="*/ 1224000 h 1224000"/>
+                <a:gd name="connsiteX3" fmla="*/ 1156005 w 1156005"/>
+                <a:gd name="connsiteY3" fmla="*/ 0 h 1224000"/>
+                <a:gd name="connsiteX4" fmla="*/ 612000 w 1156005"/>
+                <a:gd name="connsiteY4" fmla="*/ 0 h 1224000"/>
+                <a:gd name="connsiteX5" fmla="*/ 0 w 1156005"/>
+                <a:gd name="connsiteY5" fmla="*/ 612000 h 1224000"/>
+              </a:gdLst>
+              <a:ahLst/>
+              <a:cxnLst>
+                <a:cxn ang="0">
+                  <a:pos x="connsiteX0" y="connsiteY0"/>
+                </a:cxn>
+                <a:cxn ang="0">
+                  <a:pos x="connsiteX1" y="connsiteY1"/>
+                </a:cxn>
+                <a:cxn ang="0">
+                  <a:pos x="connsiteX2" y="connsiteY2"/>
+                </a:cxn>
+                <a:cxn ang="0">
+                  <a:pos x="connsiteX3" y="connsiteY3"/>
+                </a:cxn>
+                <a:cxn ang="0">
+                  <a:pos x="connsiteX4" y="connsiteY4"/>
+                </a:cxn>
+                <a:cxn ang="0">
+                  <a:pos x="connsiteX5" y="connsiteY5"/>
+                </a:cxn>
+              </a:cxnLst>
+              <a:rect l="l" t="t" r="r" b="b"/>
+              <a:pathLst>
+                <a:path w="1156005" h="1224000">
+                  <a:moveTo>
+                    <a:pt x="0" y="612000"/>
+                  </a:moveTo>
+                  <a:lnTo>
+                    <a:pt x="0" y="1224000"/>
+                  </a:lnTo>
+                  <a:lnTo>
+                    <a:pt x="1156005" y="1224000"/>
+                  </a:lnTo>
+                  <a:lnTo>
+                    <a:pt x="1156005" y="0"/>
+                  </a:lnTo>
+                  <a:lnTo>
+                    <a:pt x="612000" y="0"/>
+                  </a:lnTo>
+                  <a:cubicBezTo>
+                    <a:pt x="274002" y="0"/>
+                    <a:pt x="0" y="274002"/>
+                    <a:pt x="0" y="612000"/>
+                  </a:cubicBezTo>
+                  <a:close/>
+                </a:path>
+              </a:pathLst>
+            </a:custGeom>
+            <a:solidFill>
+              <a:srgbClr val="3A4BC0"/>
+            </a:solidFill>
+            <a:ln>
+              <a:noFill/>
+            </a:ln>
+          </p:spPr>
+          <p:style>
+            <a:lnRef idx="2">
+              <a:schemeClr val="accent1">
+                <a:shade val="15000"/>
+              </a:schemeClr>
+            </a:lnRef>
+            <a:fillRef idx="1">
+              <a:schemeClr val="accent1"/>
+            </a:fillRef>
+            <a:effectRef idx="0">
+              <a:schemeClr val="accent1"/>
+            </a:effectRef>
+            <a:fontRef idx="minor">
+              <a:schemeClr val="lt1"/>
+            </a:fontRef>
+          </p:style>
+          <p:txBody>
+            <a:bodyPr wrap="square" rtlCol="0" anchor="ctr">
+              <a:noAutofit/>
+            </a:bodyPr>
+            <a:lstStyle/>
+            <a:p>
+              <a:pPr algn="ctr"/>
+              <a:endParaRPr lang="en-CN" dirty="0"/>
+            </a:p>
+          </p:txBody>
+        </p:sp>
+        <p:sp>
+          <p:nvSpPr>
+            <p:cNvPr id="14" name="Freeform 13">
+              <a:extLst>
+                <a:ext uri="{FF2B5EF4-FFF2-40B4-BE49-F238E27FC236}">
+                  <a16:creationId xmlns:a16="http://schemas.microsoft.com/office/drawing/2014/main" id="{32B4C527-27B5-C330-BC5C-226588389AB0}"/>
+                </a:ext>
+              </a:extLst>
+            </p:cNvPr>
+            <p:cNvSpPr/>
+            <p:nvPr/>
+          </p:nvSpPr>
+          <p:spPr>
+            <a:xfrm rot="16200000" flipH="1">
+              <a:off x="6422470" y="2817000"/>
+              <a:ext cx="1156005" cy="1224000"/>
+            </a:xfrm>
+            <a:custGeom>
+              <a:avLst/>
+              <a:gdLst>
+                <a:gd name="connsiteX0" fmla="*/ 0 w 1156005"/>
+                <a:gd name="connsiteY0" fmla="*/ 612000 h 1224000"/>
+                <a:gd name="connsiteX1" fmla="*/ 0 w 1156005"/>
+                <a:gd name="connsiteY1" fmla="*/ 1224000 h 1224000"/>
+                <a:gd name="connsiteX2" fmla="*/ 1156005 w 1156005"/>
+                <a:gd name="connsiteY2" fmla="*/ 1224000 h 1224000"/>
+                <a:gd name="connsiteX3" fmla="*/ 1156005 w 1156005"/>
+                <a:gd name="connsiteY3" fmla="*/ 0 h 1224000"/>
+                <a:gd name="connsiteX4" fmla="*/ 612000 w 1156005"/>
+                <a:gd name="connsiteY4" fmla="*/ 0 h 1224000"/>
+                <a:gd name="connsiteX5" fmla="*/ 0 w 1156005"/>
+                <a:gd name="connsiteY5" fmla="*/ 612000 h 1224000"/>
+              </a:gdLst>
+              <a:ahLst/>
+              <a:cxnLst>
+                <a:cxn ang="0">
+                  <a:pos x="connsiteX0" y="connsiteY0"/>
+                </a:cxn>
+                <a:cxn ang="0">
+                  <a:pos x="connsiteX1" y="connsiteY1"/>
+                </a:cxn>
+                <a:cxn ang="0">
+                  <a:pos x="connsiteX2" y="connsiteY2"/>
+                </a:cxn>
+                <a:cxn ang="0">
+                  <a:pos x="connsiteX3" y="connsiteY3"/>
+                </a:cxn>
+                <a:cxn ang="0">
+                  <a:pos x="connsiteX4" y="connsiteY4"/>
+                </a:cxn>
+                <a:cxn ang="0">
+                  <a:pos x="connsiteX5" y="connsiteY5"/>
+                </a:cxn>
+              </a:cxnLst>
+              <a:rect l="l" t="t" r="r" b="b"/>
+              <a:pathLst>
+                <a:path w="1156005" h="1224000">
+                  <a:moveTo>
+                    <a:pt x="0" y="612000"/>
+                  </a:moveTo>
+                  <a:lnTo>
+                    <a:pt x="0" y="1224000"/>
+                  </a:lnTo>
+                  <a:lnTo>
+                    <a:pt x="1156005" y="1224000"/>
+                  </a:lnTo>
+                  <a:lnTo>
+                    <a:pt x="1156005" y="0"/>
+                  </a:lnTo>
+                  <a:lnTo>
+                    <a:pt x="612000" y="0"/>
+                  </a:lnTo>
+                  <a:cubicBezTo>
+                    <a:pt x="274002" y="0"/>
+                    <a:pt x="0" y="274002"/>
+                    <a:pt x="0" y="612000"/>
+                  </a:cubicBezTo>
+                  <a:close/>
+                </a:path>
+              </a:pathLst>
+            </a:custGeom>
+            <a:solidFill>
+              <a:srgbClr val="5EC7FE">
+                <a:alpha val="80000"/>
+              </a:srgbClr>
+            </a:solidFill>
+            <a:ln>
+              <a:noFill/>
+            </a:ln>
+          </p:spPr>
+          <p:style>
+            <a:lnRef idx="2">
+              <a:schemeClr val="accent1">
+                <a:shade val="15000"/>
+              </a:schemeClr>
+            </a:lnRef>
+            <a:fillRef idx="1">
+              <a:schemeClr val="accent1"/>
+            </a:fillRef>
+            <a:effectRef idx="0">
+              <a:schemeClr val="accent1"/>
+            </a:effectRef>
+            <a:fontRef idx="minor">
+              <a:schemeClr val="lt1"/>
+            </a:fontRef>
+          </p:style>
+          <p:txBody>
+            <a:bodyPr wrap="square" rtlCol="0" anchor="ctr">
+              <a:noAutofit/>
+            </a:bodyPr>
+            <a:lstStyle/>
+            <a:p>
+              <a:pPr algn="ctr"/>
+              <a:endParaRPr lang="en-CN" dirty="0"/>
+            </a:p>
+          </p:txBody>
+        </p:sp>
+        <p:sp>
+          <p:nvSpPr>
+            <p:cNvPr id="16" name="Freeform 15">
+              <a:extLst>
+                <a:ext uri="{FF2B5EF4-FFF2-40B4-BE49-F238E27FC236}">
+                  <a16:creationId xmlns:a16="http://schemas.microsoft.com/office/drawing/2014/main" id="{D6000649-8BA0-4F2E-1B8B-D90884C53BE8}"/>
+                </a:ext>
+              </a:extLst>
+            </p:cNvPr>
+            <p:cNvSpPr/>
+            <p:nvPr/>
+          </p:nvSpPr>
+          <p:spPr>
+            <a:xfrm rot="16200000" flipH="1">
+              <a:off x="7212361" y="2070877"/>
+              <a:ext cx="1156005" cy="1224000"/>
+            </a:xfrm>
+            <a:custGeom>
+              <a:avLst/>
+              <a:gdLst>
+                <a:gd name="connsiteX0" fmla="*/ 0 w 1156005"/>
+                <a:gd name="connsiteY0" fmla="*/ 612000 h 1224000"/>
+                <a:gd name="connsiteX1" fmla="*/ 0 w 1156005"/>
+                <a:gd name="connsiteY1" fmla="*/ 1224000 h 1224000"/>
+                <a:gd name="connsiteX2" fmla="*/ 1156005 w 1156005"/>
+                <a:gd name="connsiteY2" fmla="*/ 1224000 h 1224000"/>
+                <a:gd name="connsiteX3" fmla="*/ 1156005 w 1156005"/>
+                <a:gd name="connsiteY3" fmla="*/ 0 h 1224000"/>
+                <a:gd name="connsiteX4" fmla="*/ 612000 w 1156005"/>
+                <a:gd name="connsiteY4" fmla="*/ 0 h 1224000"/>
+                <a:gd name="connsiteX5" fmla="*/ 0 w 1156005"/>
+                <a:gd name="connsiteY5" fmla="*/ 612000 h 1224000"/>
+              </a:gdLst>
+              <a:ahLst/>
+              <a:cxnLst>
+                <a:cxn ang="0">
+                  <a:pos x="connsiteX0" y="connsiteY0"/>
+                </a:cxn>
+                <a:cxn ang="0">
+                  <a:pos x="connsiteX1" y="connsiteY1"/>
+                </a:cxn>
+                <a:cxn ang="0">
+                  <a:pos x="connsiteX2" y="connsiteY2"/>
+                </a:cxn>
+                <a:cxn ang="0">
+                  <a:pos x="connsiteX3" y="connsiteY3"/>
+                </a:cxn>
+                <a:cxn ang="0">
+                  <a:pos x="connsiteX4" y="connsiteY4"/>
+                </a:cxn>
+                <a:cxn ang="0">
+                  <a:pos x="connsiteX5" y="connsiteY5"/>
+                </a:cxn>
+              </a:cxnLst>
+              <a:rect l="l" t="t" r="r" b="b"/>
+              <a:pathLst>
+                <a:path w="1156005" h="1224000">
+                  <a:moveTo>
+                    <a:pt x="0" y="612000"/>
+                  </a:moveTo>
+                  <a:lnTo>
+                    <a:pt x="0" y="1224000"/>
+                  </a:lnTo>
+                  <a:lnTo>
+                    <a:pt x="1156005" y="1224000"/>
+                  </a:lnTo>
+                  <a:lnTo>
+                    <a:pt x="1156005" y="0"/>
+                  </a:lnTo>
+                  <a:lnTo>
+                    <a:pt x="612000" y="0"/>
+                  </a:lnTo>
+                  <a:cubicBezTo>
+                    <a:pt x="274002" y="0"/>
+                    <a:pt x="0" y="274002"/>
+                    <a:pt x="0" y="612000"/>
+                  </a:cubicBezTo>
+                  <a:close/>
+                </a:path>
+              </a:pathLst>
+            </a:custGeom>
+            <a:solidFill>
+              <a:schemeClr val="accent6">
+                <a:lumMod val="60000"/>
+                <a:lumOff val="40000"/>
+                <a:alpha val="80000"/>
+              </a:schemeClr>
+            </a:solidFill>
+            <a:ln>
+              <a:noFill/>
+            </a:ln>
+          </p:spPr>
+          <p:style>
+            <a:lnRef idx="2">
+              <a:schemeClr val="accent1">
+                <a:shade val="15000"/>
+              </a:schemeClr>
+            </a:lnRef>
+            <a:fillRef idx="1">
+              <a:schemeClr val="accent1"/>
+            </a:fillRef>
+            <a:effectRef idx="0">
+              <a:schemeClr val="accent1"/>
+            </a:effectRef>
+            <a:fontRef idx="minor">
+              <a:schemeClr val="lt1"/>
+            </a:fontRef>
+          </p:style>
+          <p:txBody>
+            <a:bodyPr rtlCol="0" anchor="ctr"/>
+            <a:lstStyle/>
+            <a:p>
+              <a:pPr algn="ctr"/>
+              <a:endParaRPr lang="en-CN" dirty="0"/>
+            </a:p>
+          </p:txBody>
+        </p:sp>
+      </p:grpSp>
+    </p:spTree>
+    <p:extLst>
+      <p:ext uri="{BB962C8B-B14F-4D97-AF65-F5344CB8AC3E}">
+        <p14:creationId xmlns:p14="http://schemas.microsoft.com/office/powerpoint/2010/main" val="973813684"/>
+      </p:ext>
+    </p:extLst>
+  </p:cSld>
+  <p:clrMapOvr>
+    <a:masterClrMapping/>
+  </p:clrMapOvr>
+</p:sld>
+</file>
+
 <file path=ppt/theme/theme1.xml><?xml version="1.0" encoding="utf-8"?>
 <a:theme xmlns:a="http://schemas.openxmlformats.org/drawingml/2006/main" name="Office Theme">
   <a:themeElements>

</xml_diff>